<commit_message>
Added puzzle to first clue
</commit_message>
<xml_diff>
--- a/Clues.pptx
+++ b/Clues.pptx
@@ -3030,7 +3030,7 @@
         <p:spPr>
           <a:xfrm>
             <a:off x="772160" y="934721"/>
-            <a:ext cx="10647680" cy="2677656"/>
+            <a:ext cx="10647680" cy="9694962"/>
           </a:xfrm>
           <a:prstGeom prst="rect">
             <a:avLst/>
@@ -3044,24 +3044,24 @@
           <a:lstStyle/>
           <a:p>
             <a:r>
-              <a:rPr lang="en-AU" sz="4000" b="1" dirty="0">
+              <a:rPr lang="en-AU" sz="4800" b="1" dirty="0">
                 <a:latin typeface="Courier New" panose="02070309020205020404" pitchFamily="49" charset="0"/>
                 <a:cs typeface="Courier New" panose="02070309020205020404" pitchFamily="49" charset="0"/>
               </a:rPr>
-              <a:t>Internal Memo</a:t>
-            </a:r>
-            <a:endParaRPr lang="en-AU" sz="4000" dirty="0">
+              <a:t>Internal Communication</a:t>
+            </a:r>
+            <a:endParaRPr lang="en-AU" sz="4800" dirty="0">
               <a:latin typeface="Courier New" panose="02070309020205020404" pitchFamily="49" charset="0"/>
               <a:cs typeface="Courier New" panose="02070309020205020404" pitchFamily="49" charset="0"/>
             </a:endParaRPr>
           </a:p>
           <a:p>
             <a:r>
-              <a:rPr lang="en-AU" sz="3200" dirty="0">
+              <a:rPr lang="en-AU" sz="4000" dirty="0">
                 <a:latin typeface="Courier New" panose="02070309020205020404" pitchFamily="49" charset="0"/>
                 <a:cs typeface="Courier New" panose="02070309020205020404" pitchFamily="49" charset="0"/>
               </a:rPr>
-              <a:t>Re:</a:t>
+              <a:t>Re: New On-Site Protocol</a:t>
             </a:r>
           </a:p>
           <a:p>
@@ -3071,27 +3071,752 @@
             </a:endParaRPr>
           </a:p>
           <a:p>
-            <a:pPr marL="457200" indent="-457200">
-              <a:buFont typeface="Arial" panose="020B0604020202020204" pitchFamily="34" charset="0"/>
-              <a:buChar char="•"/>
-            </a:pPr>
-            <a:endParaRPr lang="en-AU" sz="3200" dirty="0">
+            <a:r>
+              <a:rPr lang="en-AU" sz="2800" dirty="0">
+                <a:latin typeface="Courier New" panose="02070309020205020404" pitchFamily="49" charset="0"/>
+                <a:cs typeface="Courier New" panose="02070309020205020404" pitchFamily="49" charset="0"/>
+              </a:rPr>
+              <a:t>You’ve each been assigned a unique passcode. This is important – it will allow </a:t>
+            </a:r>
+            <a:r>
+              <a:rPr lang="en-AU" sz="2800" u="sng" dirty="0">
+                <a:latin typeface="Courier New" panose="02070309020205020404" pitchFamily="49" charset="0"/>
+                <a:cs typeface="Courier New" panose="02070309020205020404" pitchFamily="49" charset="0"/>
+              </a:rPr>
+              <a:t>y</a:t>
+            </a:r>
+            <a:r>
+              <a:rPr lang="en-AU" sz="2800" dirty="0">
+                <a:latin typeface="Courier New" panose="02070309020205020404" pitchFamily="49" charset="0"/>
+                <a:cs typeface="Courier New" panose="02070309020205020404" pitchFamily="49" charset="0"/>
+              </a:rPr>
+              <a:t>ou to unlock doors within secure areas of this site.</a:t>
+            </a:r>
+          </a:p>
+          <a:p>
+            <a:endParaRPr lang="en-AU" sz="2800" dirty="0">
               <a:latin typeface="Courier New" panose="02070309020205020404" pitchFamily="49" charset="0"/>
               <a:cs typeface="Courier New" panose="02070309020205020404" pitchFamily="49" charset="0"/>
             </a:endParaRPr>
           </a:p>
           <a:p>
-            <a:pPr marL="457200" indent="-457200">
-              <a:buFont typeface="Arial" panose="020B0604020202020204" pitchFamily="34" charset="0"/>
-              <a:buChar char="•"/>
-            </a:pPr>
-            <a:endParaRPr lang="en-AU" sz="3200" dirty="0">
+            <a:r>
+              <a:rPr lang="en-AU" sz="2800" dirty="0">
+                <a:latin typeface="Courier New" panose="02070309020205020404" pitchFamily="49" charset="0"/>
+                <a:cs typeface="Courier New" panose="02070309020205020404" pitchFamily="49" charset="0"/>
+              </a:rPr>
+              <a:t>Do not write your passcode down.</a:t>
+            </a:r>
+          </a:p>
+          <a:p>
+            <a:endParaRPr lang="en-AU" sz="2800" dirty="0">
               <a:latin typeface="Courier New" panose="02070309020205020404" pitchFamily="49" charset="0"/>
               <a:cs typeface="Courier New" panose="02070309020205020404" pitchFamily="49" charset="0"/>
             </a:endParaRPr>
           </a:p>
-        </p:txBody>
-      </p:sp>
+          <a:p>
+            <a:r>
+              <a:rPr lang="en-AU" sz="2800" dirty="0">
+                <a:latin typeface="Courier New" panose="02070309020205020404" pitchFamily="49" charset="0"/>
+                <a:cs typeface="Courier New" panose="02070309020205020404" pitchFamily="49" charset="0"/>
+              </a:rPr>
+              <a:t>I trust you are all capable of memorising a simple 10-digit alphanumeric code. If you must write yourself a hint to jog your memory, please store it in safe place, out of sight.</a:t>
+            </a:r>
+          </a:p>
+          <a:p>
+            <a:endParaRPr lang="en-AU" sz="2800" dirty="0">
+              <a:latin typeface="Courier New" panose="02070309020205020404" pitchFamily="49" charset="0"/>
+              <a:cs typeface="Courier New" panose="02070309020205020404" pitchFamily="49" charset="0"/>
+            </a:endParaRPr>
+          </a:p>
+          <a:p>
+            <a:r>
+              <a:rPr lang="en-AU" sz="2800" dirty="0">
+                <a:latin typeface="Courier New" panose="02070309020205020404" pitchFamily="49" charset="0"/>
+                <a:cs typeface="Courier New" panose="02070309020205020404" pitchFamily="49" charset="0"/>
+              </a:rPr>
+              <a:t>Last week, I came across a staff member’s password on a sticky note attached to their monitor. Needless to say, they are now a former staff member.</a:t>
+            </a:r>
+          </a:p>
+          <a:p>
+            <a:endParaRPr lang="en-AU" sz="2800" dirty="0">
+              <a:latin typeface="Courier New" panose="02070309020205020404" pitchFamily="49" charset="0"/>
+              <a:cs typeface="Courier New" panose="02070309020205020404" pitchFamily="49" charset="0"/>
+            </a:endParaRPr>
+          </a:p>
+          <a:p>
+            <a:r>
+              <a:rPr lang="en-AU" sz="2800" dirty="0">
+                <a:latin typeface="Courier New" panose="02070309020205020404" pitchFamily="49" charset="0"/>
+                <a:cs typeface="Courier New" panose="02070309020205020404" pitchFamily="49" charset="0"/>
+              </a:rPr>
+              <a:t>P Levesque,</a:t>
+            </a:r>
+          </a:p>
+          <a:p>
+            <a:r>
+              <a:rPr lang="en-AU" sz="2800" dirty="0">
+                <a:latin typeface="Courier New" panose="02070309020205020404" pitchFamily="49" charset="0"/>
+                <a:cs typeface="Courier New" panose="02070309020205020404" pitchFamily="49" charset="0"/>
+              </a:rPr>
+              <a:t>Site Director</a:t>
+            </a:r>
+          </a:p>
+        </p:txBody>
+      </p:sp>
+      <p:pic>
+        <p:nvPicPr>
+          <p:cNvPr id="3" name="Picture 2">
+            <a:extLst>
+              <a:ext uri="{FF2B5EF4-FFF2-40B4-BE49-F238E27FC236}">
+                <a16:creationId xmlns:a16="http://schemas.microsoft.com/office/drawing/2014/main" id="{F4C26BA1-64CC-48F9-A9CC-91534EC13A64}"/>
+              </a:ext>
+            </a:extLst>
+          </p:cNvPr>
+          <p:cNvPicPr>
+            <a:picLocks noChangeAspect="1"/>
+          </p:cNvPicPr>
+          <p:nvPr/>
+        </p:nvPicPr>
+        <p:blipFill>
+          <a:blip r:embed="rId4"/>
+          <a:stretch>
+            <a:fillRect/>
+          </a:stretch>
+        </p:blipFill>
+        <p:spPr>
+          <a:xfrm rot="16200000">
+            <a:off x="5296588" y="1148345"/>
+            <a:ext cx="970070" cy="409889"/>
+          </a:xfrm>
+          <a:prstGeom prst="rect">
+            <a:avLst/>
+          </a:prstGeom>
+        </p:spPr>
+      </p:pic>
+      <p:pic>
+        <p:nvPicPr>
+          <p:cNvPr id="5" name="Picture 4">
+            <a:extLst>
+              <a:ext uri="{FF2B5EF4-FFF2-40B4-BE49-F238E27FC236}">
+                <a16:creationId xmlns:a16="http://schemas.microsoft.com/office/drawing/2014/main" id="{E13BB818-A181-4298-A676-041D1018C379}"/>
+              </a:ext>
+            </a:extLst>
+          </p:cNvPr>
+          <p:cNvPicPr>
+            <a:picLocks noChangeAspect="1"/>
+          </p:cNvPicPr>
+          <p:nvPr/>
+        </p:nvPicPr>
+        <p:blipFill>
+          <a:blip r:embed="rId5">
+            <a:extLst>
+              <a:ext uri="{BEBA8EAE-BF5A-486C-A8C5-ECC9F3942E4B}">
+                <a14:imgProps xmlns:a14="http://schemas.microsoft.com/office/drawing/2010/main">
+                  <a14:imgLayer r:embed="rId6">
+                    <a14:imgEffect>
+                      <a14:brightnessContrast bright="-40000" contrast="40000"/>
+                    </a14:imgEffect>
+                  </a14:imgLayer>
+                </a14:imgProps>
+              </a:ext>
+            </a:extLst>
+          </a:blip>
+          <a:stretch>
+            <a:fillRect/>
+          </a:stretch>
+        </p:blipFill>
+        <p:spPr>
+          <a:xfrm rot="5118486">
+            <a:off x="3934263" y="1090788"/>
+            <a:ext cx="775211" cy="501501"/>
+          </a:xfrm>
+          <a:prstGeom prst="rect">
+            <a:avLst/>
+          </a:prstGeom>
+        </p:spPr>
+      </p:pic>
+      <p:pic>
+        <p:nvPicPr>
+          <p:cNvPr id="11" name="Picture 10">
+            <a:extLst>
+              <a:ext uri="{FF2B5EF4-FFF2-40B4-BE49-F238E27FC236}">
+                <a16:creationId xmlns:a16="http://schemas.microsoft.com/office/drawing/2014/main" id="{8CBF85FC-C9CD-456F-9756-0CCA273A28EF}"/>
+              </a:ext>
+            </a:extLst>
+          </p:cNvPr>
+          <p:cNvPicPr>
+            <a:picLocks noChangeAspect="1"/>
+          </p:cNvPicPr>
+          <p:nvPr/>
+        </p:nvPicPr>
+        <p:blipFill>
+          <a:blip r:embed="rId7"/>
+          <a:stretch>
+            <a:fillRect/>
+          </a:stretch>
+        </p:blipFill>
+        <p:spPr>
+          <a:xfrm>
+            <a:off x="5957058" y="1747520"/>
+            <a:ext cx="496751" cy="637680"/>
+          </a:xfrm>
+          <a:prstGeom prst="rect">
+            <a:avLst/>
+          </a:prstGeom>
+        </p:spPr>
+      </p:pic>
+      <p:pic>
+        <p:nvPicPr>
+          <p:cNvPr id="14" name="Picture 13">
+            <a:extLst>
+              <a:ext uri="{FF2B5EF4-FFF2-40B4-BE49-F238E27FC236}">
+                <a16:creationId xmlns:a16="http://schemas.microsoft.com/office/drawing/2014/main" id="{A48382BD-50AE-41D7-9169-B2200460BE56}"/>
+              </a:ext>
+            </a:extLst>
+          </p:cNvPr>
+          <p:cNvPicPr>
+            <a:picLocks noChangeAspect="1"/>
+          </p:cNvPicPr>
+          <p:nvPr/>
+        </p:nvPicPr>
+        <p:blipFill>
+          <a:blip r:embed="rId8"/>
+          <a:stretch>
+            <a:fillRect/>
+          </a:stretch>
+        </p:blipFill>
+        <p:spPr>
+          <a:xfrm rot="10194194">
+            <a:off x="1399001" y="3217610"/>
+            <a:ext cx="380269" cy="485710"/>
+          </a:xfrm>
+          <a:prstGeom prst="rect">
+            <a:avLst/>
+          </a:prstGeom>
+        </p:spPr>
+      </p:pic>
+      <p:pic>
+        <p:nvPicPr>
+          <p:cNvPr id="16" name="Picture 15">
+            <a:extLst>
+              <a:ext uri="{FF2B5EF4-FFF2-40B4-BE49-F238E27FC236}">
+                <a16:creationId xmlns:a16="http://schemas.microsoft.com/office/drawing/2014/main" id="{8CC0E220-C49E-4A29-908A-52310C624DA8}"/>
+              </a:ext>
+            </a:extLst>
+          </p:cNvPr>
+          <p:cNvPicPr>
+            <a:picLocks noChangeAspect="1"/>
+          </p:cNvPicPr>
+          <p:nvPr/>
+        </p:nvPicPr>
+        <p:blipFill>
+          <a:blip r:embed="rId9"/>
+          <a:stretch>
+            <a:fillRect/>
+          </a:stretch>
+        </p:blipFill>
+        <p:spPr>
+          <a:xfrm>
+            <a:off x="4663440" y="5319410"/>
+            <a:ext cx="229666" cy="605928"/>
+          </a:xfrm>
+          <a:prstGeom prst="rect">
+            <a:avLst/>
+          </a:prstGeom>
+        </p:spPr>
+      </p:pic>
+      <p:pic>
+        <p:nvPicPr>
+          <p:cNvPr id="20" name="Picture 19">
+            <a:extLst>
+              <a:ext uri="{FF2B5EF4-FFF2-40B4-BE49-F238E27FC236}">
+                <a16:creationId xmlns:a16="http://schemas.microsoft.com/office/drawing/2014/main" id="{8848EE19-01FC-451F-B7DE-9F748E7EEB40}"/>
+              </a:ext>
+            </a:extLst>
+          </p:cNvPr>
+          <p:cNvPicPr>
+            <a:picLocks noChangeAspect="1"/>
+          </p:cNvPicPr>
+          <p:nvPr/>
+        </p:nvPicPr>
+        <p:blipFill>
+          <a:blip r:embed="rId10"/>
+          <a:stretch>
+            <a:fillRect/>
+          </a:stretch>
+        </p:blipFill>
+        <p:spPr>
+          <a:xfrm>
+            <a:off x="6883815" y="3188038"/>
+            <a:ext cx="427928" cy="579218"/>
+          </a:xfrm>
+          <a:prstGeom prst="rect">
+            <a:avLst/>
+          </a:prstGeom>
+        </p:spPr>
+      </p:pic>
+      <p:pic>
+        <p:nvPicPr>
+          <p:cNvPr id="23" name="Picture 22">
+            <a:extLst>
+              <a:ext uri="{FF2B5EF4-FFF2-40B4-BE49-F238E27FC236}">
+                <a16:creationId xmlns:a16="http://schemas.microsoft.com/office/drawing/2014/main" id="{F19554A9-EBC2-4D8D-8184-B76D6DC351A3}"/>
+              </a:ext>
+            </a:extLst>
+          </p:cNvPr>
+          <p:cNvPicPr>
+            <a:picLocks noChangeAspect="1"/>
+          </p:cNvPicPr>
+          <p:nvPr/>
+        </p:nvPicPr>
+        <p:blipFill>
+          <a:blip r:embed="rId11"/>
+          <a:stretch>
+            <a:fillRect/>
+          </a:stretch>
+        </p:blipFill>
+        <p:spPr>
+          <a:xfrm>
+            <a:off x="4205741" y="3144225"/>
+            <a:ext cx="341493" cy="666843"/>
+          </a:xfrm>
+          <a:prstGeom prst="rect">
+            <a:avLst/>
+          </a:prstGeom>
+        </p:spPr>
+      </p:pic>
+      <p:pic>
+        <p:nvPicPr>
+          <p:cNvPr id="25" name="Picture 24">
+            <a:extLst>
+              <a:ext uri="{FF2B5EF4-FFF2-40B4-BE49-F238E27FC236}">
+                <a16:creationId xmlns:a16="http://schemas.microsoft.com/office/drawing/2014/main" id="{451070EB-9C6F-40E2-AC5E-7B6B93CD5082}"/>
+              </a:ext>
+            </a:extLst>
+          </p:cNvPr>
+          <p:cNvPicPr>
+            <a:picLocks noChangeAspect="1"/>
+          </p:cNvPicPr>
+          <p:nvPr/>
+        </p:nvPicPr>
+        <p:blipFill>
+          <a:blip r:embed="rId12">
+            <a:extLst>
+              <a:ext uri="{BEBA8EAE-BF5A-486C-A8C5-ECC9F3942E4B}">
+                <a14:imgProps xmlns:a14="http://schemas.microsoft.com/office/drawing/2010/main">
+                  <a14:imgLayer r:embed="rId13">
+                    <a14:imgEffect>
+                      <a14:brightnessContrast bright="-40000" contrast="40000"/>
+                    </a14:imgEffect>
+                  </a14:imgLayer>
+                </a14:imgProps>
+              </a:ext>
+            </a:extLst>
+          </a:blip>
+          <a:stretch>
+            <a:fillRect/>
+          </a:stretch>
+        </p:blipFill>
+        <p:spPr>
+          <a:xfrm>
+            <a:off x="2693719" y="4435486"/>
+            <a:ext cx="382047" cy="626099"/>
+          </a:xfrm>
+          <a:prstGeom prst="rect">
+            <a:avLst/>
+          </a:prstGeom>
+        </p:spPr>
+      </p:pic>
+      <p:pic>
+        <p:nvPicPr>
+          <p:cNvPr id="27" name="Picture 26">
+            <a:extLst>
+              <a:ext uri="{FF2B5EF4-FFF2-40B4-BE49-F238E27FC236}">
+                <a16:creationId xmlns:a16="http://schemas.microsoft.com/office/drawing/2014/main" id="{6EE06D4C-5F62-4E3B-A71C-DE4883CD2831}"/>
+              </a:ext>
+            </a:extLst>
+          </p:cNvPr>
+          <p:cNvPicPr>
+            <a:picLocks noChangeAspect="1"/>
+          </p:cNvPicPr>
+          <p:nvPr/>
+        </p:nvPicPr>
+        <p:blipFill rotWithShape="1">
+          <a:blip r:embed="rId14"/>
+          <a:srcRect b="3757"/>
+          <a:stretch/>
+        </p:blipFill>
+        <p:spPr>
+          <a:xfrm>
+            <a:off x="9297811" y="2724096"/>
+            <a:ext cx="396733" cy="640134"/>
+          </a:xfrm>
+          <a:prstGeom prst="rect">
+            <a:avLst/>
+          </a:prstGeom>
+        </p:spPr>
+      </p:pic>
+      <p:pic>
+        <p:nvPicPr>
+          <p:cNvPr id="29" name="Picture 28">
+            <a:extLst>
+              <a:ext uri="{FF2B5EF4-FFF2-40B4-BE49-F238E27FC236}">
+                <a16:creationId xmlns:a16="http://schemas.microsoft.com/office/drawing/2014/main" id="{CE17565B-82B7-40DE-BC7C-C9F0FCFF8E48}"/>
+              </a:ext>
+            </a:extLst>
+          </p:cNvPr>
+          <p:cNvPicPr>
+            <a:picLocks noChangeAspect="1"/>
+          </p:cNvPicPr>
+          <p:nvPr/>
+        </p:nvPicPr>
+        <p:blipFill>
+          <a:blip r:embed="rId15"/>
+          <a:stretch>
+            <a:fillRect/>
+          </a:stretch>
+        </p:blipFill>
+        <p:spPr>
+          <a:xfrm>
+            <a:off x="9523070" y="3135997"/>
+            <a:ext cx="342948" cy="675071"/>
+          </a:xfrm>
+          <a:prstGeom prst="rect">
+            <a:avLst/>
+          </a:prstGeom>
+        </p:spPr>
+      </p:pic>
+      <p:pic>
+        <p:nvPicPr>
+          <p:cNvPr id="31" name="Picture 30">
+            <a:extLst>
+              <a:ext uri="{FF2B5EF4-FFF2-40B4-BE49-F238E27FC236}">
+                <a16:creationId xmlns:a16="http://schemas.microsoft.com/office/drawing/2014/main" id="{54E7359F-6B1A-400A-BB77-62CCB0F16C5F}"/>
+              </a:ext>
+            </a:extLst>
+          </p:cNvPr>
+          <p:cNvPicPr>
+            <a:picLocks noChangeAspect="1"/>
+          </p:cNvPicPr>
+          <p:nvPr/>
+        </p:nvPicPr>
+        <p:blipFill>
+          <a:blip r:embed="rId16"/>
+          <a:stretch>
+            <a:fillRect/>
+          </a:stretch>
+        </p:blipFill>
+        <p:spPr>
+          <a:xfrm>
+            <a:off x="10997233" y="2653338"/>
+            <a:ext cx="389587" cy="838317"/>
+          </a:xfrm>
+          <a:prstGeom prst="rect">
+            <a:avLst/>
+          </a:prstGeom>
+        </p:spPr>
+      </p:pic>
+      <p:pic>
+        <p:nvPicPr>
+          <p:cNvPr id="33" name="Picture 32">
+            <a:extLst>
+              <a:ext uri="{FF2B5EF4-FFF2-40B4-BE49-F238E27FC236}">
+                <a16:creationId xmlns:a16="http://schemas.microsoft.com/office/drawing/2014/main" id="{C3926397-4AC9-4B83-B2C3-FC38E5C354F6}"/>
+              </a:ext>
+            </a:extLst>
+          </p:cNvPr>
+          <p:cNvPicPr>
+            <a:picLocks noChangeAspect="1"/>
+          </p:cNvPicPr>
+          <p:nvPr/>
+        </p:nvPicPr>
+        <p:blipFill>
+          <a:blip r:embed="rId17"/>
+          <a:stretch>
+            <a:fillRect/>
+          </a:stretch>
+        </p:blipFill>
+        <p:spPr>
+          <a:xfrm>
+            <a:off x="8047657" y="6520053"/>
+            <a:ext cx="380064" cy="791338"/>
+          </a:xfrm>
+          <a:prstGeom prst="rect">
+            <a:avLst/>
+          </a:prstGeom>
+        </p:spPr>
+      </p:pic>
+      <p:pic>
+        <p:nvPicPr>
+          <p:cNvPr id="35" name="Picture 34">
+            <a:extLst>
+              <a:ext uri="{FF2B5EF4-FFF2-40B4-BE49-F238E27FC236}">
+                <a16:creationId xmlns:a16="http://schemas.microsoft.com/office/drawing/2014/main" id="{5E2E8FF4-D797-4998-BB25-1A6A0C5E8A22}"/>
+              </a:ext>
+            </a:extLst>
+          </p:cNvPr>
+          <p:cNvPicPr>
+            <a:picLocks noChangeAspect="1"/>
+          </p:cNvPicPr>
+          <p:nvPr/>
+        </p:nvPicPr>
+        <p:blipFill>
+          <a:blip r:embed="rId18"/>
+          <a:stretch>
+            <a:fillRect/>
+          </a:stretch>
+        </p:blipFill>
+        <p:spPr>
+          <a:xfrm flipH="1" flipV="1">
+            <a:off x="7206927" y="7840526"/>
+            <a:ext cx="291765" cy="574948"/>
+          </a:xfrm>
+          <a:prstGeom prst="rect">
+            <a:avLst/>
+          </a:prstGeom>
+        </p:spPr>
+      </p:pic>
+      <p:pic>
+        <p:nvPicPr>
+          <p:cNvPr id="37" name="Picture 36">
+            <a:extLst>
+              <a:ext uri="{FF2B5EF4-FFF2-40B4-BE49-F238E27FC236}">
+                <a16:creationId xmlns:a16="http://schemas.microsoft.com/office/drawing/2014/main" id="{22FF5E95-D09A-4818-B320-BEECDC22F139}"/>
+              </a:ext>
+            </a:extLst>
+          </p:cNvPr>
+          <p:cNvPicPr>
+            <a:picLocks noChangeAspect="1"/>
+          </p:cNvPicPr>
+          <p:nvPr/>
+        </p:nvPicPr>
+        <p:blipFill>
+          <a:blip r:embed="rId19"/>
+          <a:stretch>
+            <a:fillRect/>
+          </a:stretch>
+        </p:blipFill>
+        <p:spPr>
+          <a:xfrm>
+            <a:off x="2286000" y="6633697"/>
+            <a:ext cx="295485" cy="483383"/>
+          </a:xfrm>
+          <a:prstGeom prst="rect">
+            <a:avLst/>
+          </a:prstGeom>
+        </p:spPr>
+      </p:pic>
+      <p:pic>
+        <p:nvPicPr>
+          <p:cNvPr id="39" name="Picture 38">
+            <a:extLst>
+              <a:ext uri="{FF2B5EF4-FFF2-40B4-BE49-F238E27FC236}">
+                <a16:creationId xmlns:a16="http://schemas.microsoft.com/office/drawing/2014/main" id="{EC19A3AA-4110-4967-BD25-635B9C70BD9A}"/>
+              </a:ext>
+            </a:extLst>
+          </p:cNvPr>
+          <p:cNvPicPr>
+            <a:picLocks noChangeAspect="1"/>
+          </p:cNvPicPr>
+          <p:nvPr/>
+        </p:nvPicPr>
+        <p:blipFill>
+          <a:blip r:embed="rId20"/>
+          <a:stretch>
+            <a:fillRect/>
+          </a:stretch>
+        </p:blipFill>
+        <p:spPr>
+          <a:xfrm rot="10405335">
+            <a:off x="2884820" y="5693055"/>
+            <a:ext cx="381891" cy="609685"/>
+          </a:xfrm>
+          <a:prstGeom prst="rect">
+            <a:avLst/>
+          </a:prstGeom>
+        </p:spPr>
+      </p:pic>
+      <p:pic>
+        <p:nvPicPr>
+          <p:cNvPr id="41" name="Picture 40">
+            <a:extLst>
+              <a:ext uri="{FF2B5EF4-FFF2-40B4-BE49-F238E27FC236}">
+                <a16:creationId xmlns:a16="http://schemas.microsoft.com/office/drawing/2014/main" id="{0828E29D-2159-4FD1-9CCA-FC9087433DB8}"/>
+              </a:ext>
+            </a:extLst>
+          </p:cNvPr>
+          <p:cNvPicPr>
+            <a:picLocks noChangeAspect="1"/>
+          </p:cNvPicPr>
+          <p:nvPr/>
+        </p:nvPicPr>
+        <p:blipFill>
+          <a:blip r:embed="rId21"/>
+          <a:stretch>
+            <a:fillRect/>
+          </a:stretch>
+        </p:blipFill>
+        <p:spPr>
+          <a:xfrm rot="15347774">
+            <a:off x="4178161" y="7605506"/>
+            <a:ext cx="459476" cy="358500"/>
+          </a:xfrm>
+          <a:prstGeom prst="rect">
+            <a:avLst/>
+          </a:prstGeom>
+        </p:spPr>
+      </p:pic>
+      <p:pic>
+        <p:nvPicPr>
+          <p:cNvPr id="43" name="Picture 42">
+            <a:extLst>
+              <a:ext uri="{FF2B5EF4-FFF2-40B4-BE49-F238E27FC236}">
+                <a16:creationId xmlns:a16="http://schemas.microsoft.com/office/drawing/2014/main" id="{E2C34DBB-3DE4-4D47-A583-BF69CC2D4DA5}"/>
+              </a:ext>
+            </a:extLst>
+          </p:cNvPr>
+          <p:cNvPicPr>
+            <a:picLocks noChangeAspect="1"/>
+          </p:cNvPicPr>
+          <p:nvPr/>
+        </p:nvPicPr>
+        <p:blipFill>
+          <a:blip r:embed="rId22"/>
+          <a:stretch>
+            <a:fillRect/>
+          </a:stretch>
+        </p:blipFill>
+        <p:spPr>
+          <a:xfrm>
+            <a:off x="6083461" y="5201920"/>
+            <a:ext cx="370348" cy="752797"/>
+          </a:xfrm>
+          <a:prstGeom prst="rect">
+            <a:avLst/>
+          </a:prstGeom>
+        </p:spPr>
+      </p:pic>
+      <p:pic>
+        <p:nvPicPr>
+          <p:cNvPr id="45" name="Picture 44">
+            <a:extLst>
+              <a:ext uri="{FF2B5EF4-FFF2-40B4-BE49-F238E27FC236}">
+                <a16:creationId xmlns:a16="http://schemas.microsoft.com/office/drawing/2014/main" id="{D80C4C07-5E24-4287-992D-4E3871BC2F56}"/>
+              </a:ext>
+            </a:extLst>
+          </p:cNvPr>
+          <p:cNvPicPr>
+            <a:picLocks noChangeAspect="1"/>
+          </p:cNvPicPr>
+          <p:nvPr/>
+        </p:nvPicPr>
+        <p:blipFill>
+          <a:blip r:embed="rId23"/>
+          <a:stretch>
+            <a:fillRect/>
+          </a:stretch>
+        </p:blipFill>
+        <p:spPr>
+          <a:xfrm>
+            <a:off x="1165560" y="8752840"/>
+            <a:ext cx="387620" cy="530261"/>
+          </a:xfrm>
+          <a:prstGeom prst="rect">
+            <a:avLst/>
+          </a:prstGeom>
+        </p:spPr>
+      </p:pic>
+      <p:pic>
+        <p:nvPicPr>
+          <p:cNvPr id="47" name="Picture 46">
+            <a:extLst>
+              <a:ext uri="{FF2B5EF4-FFF2-40B4-BE49-F238E27FC236}">
+                <a16:creationId xmlns:a16="http://schemas.microsoft.com/office/drawing/2014/main" id="{B13DD636-1C64-4A48-AE38-AF566DAFD8EF}"/>
+              </a:ext>
+            </a:extLst>
+          </p:cNvPr>
+          <p:cNvPicPr>
+            <a:picLocks noChangeAspect="1"/>
+          </p:cNvPicPr>
+          <p:nvPr/>
+        </p:nvPicPr>
+        <p:blipFill>
+          <a:blip r:embed="rId24"/>
+          <a:stretch>
+            <a:fillRect/>
+          </a:stretch>
+        </p:blipFill>
+        <p:spPr>
+          <a:xfrm>
+            <a:off x="7617136" y="5319410"/>
+            <a:ext cx="338143" cy="541986"/>
+          </a:xfrm>
+          <a:prstGeom prst="rect">
+            <a:avLst/>
+          </a:prstGeom>
+        </p:spPr>
+      </p:pic>
+      <p:pic>
+        <p:nvPicPr>
+          <p:cNvPr id="49" name="Picture 48">
+            <a:extLst>
+              <a:ext uri="{FF2B5EF4-FFF2-40B4-BE49-F238E27FC236}">
+                <a16:creationId xmlns:a16="http://schemas.microsoft.com/office/drawing/2014/main" id="{8BA5C01E-4AF9-4559-9849-4906C79DBF1B}"/>
+              </a:ext>
+            </a:extLst>
+          </p:cNvPr>
+          <p:cNvPicPr>
+            <a:picLocks noChangeAspect="1"/>
+          </p:cNvPicPr>
+          <p:nvPr/>
+        </p:nvPicPr>
+        <p:blipFill>
+          <a:blip r:embed="rId25"/>
+          <a:stretch>
+            <a:fillRect/>
+          </a:stretch>
+        </p:blipFill>
+        <p:spPr>
+          <a:xfrm>
+            <a:off x="2938374" y="10041291"/>
+            <a:ext cx="362001" cy="489549"/>
+          </a:xfrm>
+          <a:prstGeom prst="rect">
+            <a:avLst/>
+          </a:prstGeom>
+        </p:spPr>
+      </p:pic>
+      <p:pic>
+        <p:nvPicPr>
+          <p:cNvPr id="51" name="Picture 50">
+            <a:extLst>
+              <a:ext uri="{FF2B5EF4-FFF2-40B4-BE49-F238E27FC236}">
+                <a16:creationId xmlns:a16="http://schemas.microsoft.com/office/drawing/2014/main" id="{D9A56405-33F5-42DE-B33A-F9C461AD7BE3}"/>
+              </a:ext>
+            </a:extLst>
+          </p:cNvPr>
+          <p:cNvPicPr>
+            <a:picLocks noChangeAspect="1"/>
+          </p:cNvPicPr>
+          <p:nvPr/>
+        </p:nvPicPr>
+        <p:blipFill>
+          <a:blip r:embed="rId26"/>
+          <a:stretch>
+            <a:fillRect/>
+          </a:stretch>
+        </p:blipFill>
+        <p:spPr>
+          <a:xfrm>
+            <a:off x="5085664" y="2735492"/>
+            <a:ext cx="284077" cy="628738"/>
+          </a:xfrm>
+          <a:prstGeom prst="rect">
+            <a:avLst/>
+          </a:prstGeom>
+        </p:spPr>
+      </p:pic>
     </p:spTree>
     <p:extLst>
       <p:ext uri="{BB962C8B-B14F-4D97-AF65-F5344CB8AC3E}">

</xml_diff>